<commit_message>
Update Folhas de Rosto ODI - Fórum PCP.pptx
</commit_message>
<xml_diff>
--- a/imprime_folha_de_rosto/Folhas de Rosto ODI - Fórum PCP.pptx
+++ b/imprime_folha_de_rosto/Folhas de Rosto ODI - Fórum PCP.pptx
@@ -5277,18 +5277,21 @@
           <a:bodyPr/>
           <a:lstStyle/>
           <a:p>
+            <a:pPr algn="just"/>
             <a:r>
               <a:rPr lang="pt-BR" dirty="0"/>
               <a:t>O objetivo final da apresentação não foi apenas a apresentação da melhoria em si, mas principalmente mostrar que ela só foi possível pela sugestão e participação do envolvido diretamente no processo.</a:t>
             </a:r>
           </a:p>
           <a:p>
+            <a:pPr algn="just"/>
             <a:r>
               <a:rPr lang="pt-BR" dirty="0"/>
               <a:t>Muitas vezes a melhoria ou automatização é feita pelo próprio atuante direto no trabalho naquela função e/ou atividade no dia-a-dia, porém quando não é esse o caso, sugestões são necessárias para que elas possam ser avaliadas.</a:t>
             </a:r>
           </a:p>
           <a:p>
+            <a:pPr algn="just"/>
             <a:r>
               <a:rPr lang="pt-BR" dirty="0"/>
               <a:t>Sendo assim gostaria de utilizar o exemplo para motivar a equipe em contribuir, pensando se em sua rotina não existe algum trabalho que possa ser objeto dessa análise para posterior automatização ou digitalmente processado de alguma forma.</a:t>
@@ -5527,7 +5530,7 @@
             <a:endParaRPr lang="pt-BR" dirty="0"/>
           </a:p>
           <a:p>
-            <a:pPr marL="174625" indent="0">
+            <a:pPr marL="174625" indent="0" algn="just">
               <a:buNone/>
             </a:pPr>
             <a:r>
@@ -5536,13 +5539,13 @@
             </a:r>
           </a:p>
           <a:p>
-            <a:pPr marL="174625" indent="0">
+            <a:pPr marL="174625" indent="0" algn="just">
               <a:buNone/>
             </a:pPr>
             <a:endParaRPr lang="pt-BR" dirty="0"/>
           </a:p>
           <a:p>
-            <a:pPr marL="174625" indent="0">
+            <a:pPr marL="174625" indent="0" algn="just">
               <a:buNone/>
             </a:pPr>
             <a:r>
@@ -6066,7 +6069,7 @@
           <a:bodyPr/>
           <a:lstStyle/>
           <a:p>
-            <a:pPr marL="174625" indent="0">
+            <a:pPr marL="174625" indent="0" algn="just">
               <a:buNone/>
             </a:pPr>
             <a:r>
@@ -6083,13 +6086,13 @@
             </a:r>
           </a:p>
           <a:p>
-            <a:pPr marL="174625" indent="0">
+            <a:pPr marL="174625" indent="0" algn="just">
               <a:buNone/>
             </a:pPr>
             <a:endParaRPr lang="pt-BR" dirty="0"/>
           </a:p>
           <a:p>
-            <a:pPr marL="174625" indent="0">
+            <a:pPr marL="174625" indent="0" algn="just">
               <a:buNone/>
             </a:pPr>
             <a:r>
@@ -6106,21 +6109,21 @@
             </a:r>
           </a:p>
           <a:p>
-            <a:pPr lvl="1"/>
+            <a:pPr lvl="1" algn="just"/>
             <a:r>
               <a:rPr lang="pt-BR" dirty="0"/>
               <a:t>Espera (Aguarda por dados e informação necessária)</a:t>
             </a:r>
           </a:p>
           <a:p>
-            <a:pPr lvl="1"/>
+            <a:pPr lvl="1" algn="just"/>
             <a:r>
               <a:rPr lang="pt-BR" dirty="0"/>
               <a:t>Defeito (Dados incorretos transferidos entre processos)</a:t>
             </a:r>
           </a:p>
           <a:p>
-            <a:pPr lvl="1"/>
+            <a:pPr lvl="1" algn="just"/>
             <a:r>
               <a:rPr lang="pt-BR" dirty="0"/>
               <a:t>Intelectual (Equipe investindo tempo em atividades repetitivas)</a:t>
@@ -6212,7 +6215,7 @@
           <a:bodyPr/>
           <a:lstStyle/>
           <a:p>
-            <a:pPr marL="174625" indent="0">
+            <a:pPr marL="174625" indent="0" algn="just">
               <a:buNone/>
             </a:pPr>
             <a:r>
@@ -6221,7 +6224,7 @@
             </a:r>
           </a:p>
           <a:p>
-            <a:pPr marL="174625" indent="0">
+            <a:pPr marL="174625" indent="0" algn="just">
               <a:buNone/>
             </a:pPr>
             <a:r>
@@ -6230,7 +6233,7 @@
             </a:r>
           </a:p>
           <a:p>
-            <a:pPr marL="174625" indent="0">
+            <a:pPr marL="174625" indent="0" algn="just">
               <a:buNone/>
             </a:pPr>
             <a:r>
@@ -6904,7 +6907,7 @@
             <a:endParaRPr lang="pt-BR" dirty="0"/>
           </a:p>
           <a:p>
-            <a:pPr marL="174625" indent="0">
+            <a:pPr marL="174625" indent="0" algn="just">
               <a:buNone/>
             </a:pPr>
             <a:r>

</xml_diff>